<commit_message>
Final Update: Requirements & Modeling
Contém a versão final a adotar do modelo EA, bem como a respetiva
atualização desse modelo no relatório já entregue.
</commit_message>
<xml_diff>
--- a/Requisitos_Modelação/modelo_ea_gestbook.pptx
+++ b/Requisitos_Modelação/modelo_ea_gestbook.pptx
@@ -3448,10 +3448,10 @@
           <a:p>
             <a:pPr algn="ctr"/>
             <a:r>
-              <a:rPr lang="pt-PT" sz="2266" u="sng" smtClean="0"/>
+              <a:rPr lang="pt-PT" sz="2266" dirty="0" err="1" smtClean="0"/>
               <a:t>Cabimentacao</a:t>
             </a:r>
-            <a:endParaRPr lang="pt-PT" sz="2266" u="sng" dirty="0"/>
+            <a:endParaRPr lang="pt-PT" sz="2266" dirty="0"/>
           </a:p>
         </p:txBody>
       </p:sp>

</xml_diff>

<commit_message>
Arquitetura (e outras alterações) v3
</commit_message>
<xml_diff>
--- a/Requisitos_Modelação/modelo_ea_gestbook.pptx
+++ b/Requisitos_Modelação/modelo_ea_gestbook.pptx
@@ -243,7 +243,7 @@
           <a:p>
             <a:fld id="{FB853126-9845-4C81-862B-4734F08A92B8}" type="datetimeFigureOut">
               <a:rPr lang="pt-PT" smtClean="0"/>
-              <a:t>27/11/2014</a:t>
+              <a:t>28/11/2014</a:t>
             </a:fld>
             <a:endParaRPr lang="pt-PT"/>
           </a:p>
@@ -413,7 +413,7 @@
           <a:p>
             <a:fld id="{FB853126-9845-4C81-862B-4734F08A92B8}" type="datetimeFigureOut">
               <a:rPr lang="pt-PT" smtClean="0"/>
-              <a:t>27/11/2014</a:t>
+              <a:t>28/11/2014</a:t>
             </a:fld>
             <a:endParaRPr lang="pt-PT"/>
           </a:p>
@@ -593,7 +593,7 @@
           <a:p>
             <a:fld id="{FB853126-9845-4C81-862B-4734F08A92B8}" type="datetimeFigureOut">
               <a:rPr lang="pt-PT" smtClean="0"/>
-              <a:t>27/11/2014</a:t>
+              <a:t>28/11/2014</a:t>
             </a:fld>
             <a:endParaRPr lang="pt-PT"/>
           </a:p>
@@ -763,7 +763,7 @@
           <a:p>
             <a:fld id="{FB853126-9845-4C81-862B-4734F08A92B8}" type="datetimeFigureOut">
               <a:rPr lang="pt-PT" smtClean="0"/>
-              <a:t>27/11/2014</a:t>
+              <a:t>28/11/2014</a:t>
             </a:fld>
             <a:endParaRPr lang="pt-PT"/>
           </a:p>
@@ -1007,7 +1007,7 @@
           <a:p>
             <a:fld id="{FB853126-9845-4C81-862B-4734F08A92B8}" type="datetimeFigureOut">
               <a:rPr lang="pt-PT" smtClean="0"/>
-              <a:t>27/11/2014</a:t>
+              <a:t>28/11/2014</a:t>
             </a:fld>
             <a:endParaRPr lang="pt-PT"/>
           </a:p>
@@ -1239,7 +1239,7 @@
           <a:p>
             <a:fld id="{FB853126-9845-4C81-862B-4734F08A92B8}" type="datetimeFigureOut">
               <a:rPr lang="pt-PT" smtClean="0"/>
-              <a:t>27/11/2014</a:t>
+              <a:t>28/11/2014</a:t>
             </a:fld>
             <a:endParaRPr lang="pt-PT"/>
           </a:p>
@@ -1606,7 +1606,7 @@
           <a:p>
             <a:fld id="{FB853126-9845-4C81-862B-4734F08A92B8}" type="datetimeFigureOut">
               <a:rPr lang="pt-PT" smtClean="0"/>
-              <a:t>27/11/2014</a:t>
+              <a:t>28/11/2014</a:t>
             </a:fld>
             <a:endParaRPr lang="pt-PT"/>
           </a:p>
@@ -1724,7 +1724,7 @@
           <a:p>
             <a:fld id="{FB853126-9845-4C81-862B-4734F08A92B8}" type="datetimeFigureOut">
               <a:rPr lang="pt-PT" smtClean="0"/>
-              <a:t>27/11/2014</a:t>
+              <a:t>28/11/2014</a:t>
             </a:fld>
             <a:endParaRPr lang="pt-PT"/>
           </a:p>
@@ -1819,7 +1819,7 @@
           <a:p>
             <a:fld id="{FB853126-9845-4C81-862B-4734F08A92B8}" type="datetimeFigureOut">
               <a:rPr lang="pt-PT" smtClean="0"/>
-              <a:t>27/11/2014</a:t>
+              <a:t>28/11/2014</a:t>
             </a:fld>
             <a:endParaRPr lang="pt-PT"/>
           </a:p>
@@ -2096,7 +2096,7 @@
           <a:p>
             <a:fld id="{FB853126-9845-4C81-862B-4734F08A92B8}" type="datetimeFigureOut">
               <a:rPr lang="pt-PT" smtClean="0"/>
-              <a:t>27/11/2014</a:t>
+              <a:t>28/11/2014</a:t>
             </a:fld>
             <a:endParaRPr lang="pt-PT"/>
           </a:p>
@@ -2353,7 +2353,7 @@
           <a:p>
             <a:fld id="{FB853126-9845-4C81-862B-4734F08A92B8}" type="datetimeFigureOut">
               <a:rPr lang="pt-PT" smtClean="0"/>
-              <a:t>27/11/2014</a:t>
+              <a:t>28/11/2014</a:t>
             </a:fld>
             <a:endParaRPr lang="pt-PT"/>
           </a:p>
@@ -2566,7 +2566,7 @@
           <a:p>
             <a:fld id="{FB853126-9845-4C81-862B-4734F08A92B8}" type="datetimeFigureOut">
               <a:rPr lang="pt-PT" smtClean="0"/>
-              <a:t>27/11/2014</a:t>
+              <a:t>28/11/2014</a:t>
             </a:fld>
             <a:endParaRPr lang="pt-PT"/>
           </a:p>
@@ -3219,7 +3219,7 @@
         </p:nvSpPr>
         <p:spPr>
           <a:xfrm>
-            <a:off x="1457184" y="12521526"/>
+            <a:off x="1253982" y="12724728"/>
             <a:ext cx="1444152" cy="893694"/>
           </a:xfrm>
           <a:prstGeom prst="ellipse">
@@ -3716,8 +3716,8 @@
         </p:nvCxnSpPr>
         <p:spPr>
           <a:xfrm flipH="1">
-            <a:off x="2689845" y="10572252"/>
-            <a:ext cx="2088826" cy="2080152"/>
+            <a:off x="2486643" y="10572252"/>
+            <a:ext cx="2292028" cy="2283354"/>
           </a:xfrm>
           <a:prstGeom prst="line">
             <a:avLst/>
@@ -3903,7 +3903,7 @@
         </p:nvSpPr>
         <p:spPr>
           <a:xfrm>
-            <a:off x="3506195" y="6868026"/>
+            <a:off x="3506195" y="6764116"/>
             <a:ext cx="2611212" cy="1331621"/>
           </a:xfrm>
           <a:prstGeom prst="diamond">
@@ -3956,8 +3956,8 @@
         </p:nvCxnSpPr>
         <p:spPr>
           <a:xfrm flipV="1">
-            <a:off x="4778671" y="8199647"/>
-            <a:ext cx="33130" cy="1444735"/>
+            <a:off x="4778671" y="8095737"/>
+            <a:ext cx="33130" cy="1548645"/>
           </a:xfrm>
           <a:prstGeom prst="line">
             <a:avLst/>
@@ -3995,7 +3995,7 @@
         <p:spPr>
           <a:xfrm flipV="1">
             <a:off x="4811801" y="4878800"/>
-            <a:ext cx="76865" cy="1989226"/>
+            <a:ext cx="76865" cy="1885316"/>
           </a:xfrm>
           <a:prstGeom prst="line">
             <a:avLst/>
@@ -4062,7 +4062,7 @@
         </p:nvSpPr>
         <p:spPr>
           <a:xfrm>
-            <a:off x="4850233" y="4847053"/>
+            <a:off x="4891797" y="4867835"/>
             <a:ext cx="219602" cy="371320"/>
           </a:xfrm>
           <a:prstGeom prst="rect">
@@ -4133,7 +4133,7 @@
         </p:nvSpPr>
         <p:spPr>
           <a:xfrm rot="19199854">
-            <a:off x="7927470" y="6765025"/>
+            <a:off x="7948252" y="6640333"/>
             <a:ext cx="2112267" cy="1039437"/>
           </a:xfrm>
           <a:prstGeom prst="diamond">
@@ -4182,8 +4182,8 @@
         </p:nvCxnSpPr>
         <p:spPr>
           <a:xfrm flipH="1">
-            <a:off x="5780417" y="7963648"/>
-            <a:ext cx="2394170" cy="2144669"/>
+            <a:off x="5780417" y="7838956"/>
+            <a:ext cx="2414952" cy="2269361"/>
           </a:xfrm>
           <a:prstGeom prst="line">
             <a:avLst/>
@@ -4220,8 +4220,8 @@
         </p:nvCxnSpPr>
         <p:spPr>
           <a:xfrm flipV="1">
-            <a:off x="9792620" y="4474276"/>
-            <a:ext cx="2232947" cy="2131564"/>
+            <a:off x="9813402" y="4474276"/>
+            <a:ext cx="2212165" cy="2006872"/>
           </a:xfrm>
           <a:prstGeom prst="line">
             <a:avLst/>
@@ -4255,7 +4255,7 @@
         </p:nvSpPr>
         <p:spPr>
           <a:xfrm rot="40901">
-            <a:off x="8340227" y="3931662"/>
+            <a:off x="8028500" y="3931662"/>
             <a:ext cx="2112267" cy="1039437"/>
           </a:xfrm>
           <a:prstGeom prst="diamond">
@@ -4302,7 +4302,7 @@
         </p:nvSpPr>
         <p:spPr>
           <a:xfrm>
-            <a:off x="11734032" y="4183757"/>
+            <a:off x="11734032" y="4142193"/>
             <a:ext cx="330174" cy="371320"/>
           </a:xfrm>
           <a:prstGeom prst="rect">
@@ -4490,8 +4490,8 @@
         </p:nvCxnSpPr>
         <p:spPr>
           <a:xfrm>
-            <a:off x="10452419" y="4463946"/>
-            <a:ext cx="1573148" cy="10330"/>
+            <a:off x="10140692" y="4463946"/>
+            <a:ext cx="1884875" cy="10330"/>
           </a:xfrm>
           <a:prstGeom prst="line">
             <a:avLst/>
@@ -4525,7 +4525,7 @@
         <p:spPr>
           <a:xfrm flipH="1">
             <a:off x="5948231" y="4438816"/>
-            <a:ext cx="2392071" cy="12565"/>
+            <a:ext cx="2080344" cy="12565"/>
           </a:xfrm>
           <a:prstGeom prst="line">
             <a:avLst/>
@@ -5104,7 +5104,7 @@
           <a:prstGeom prst="line">
             <a:avLst/>
           </a:prstGeom>
-          <a:ln>
+          <a:ln w="57150">
             <a:solidFill>
               <a:schemeClr val="tx1"/>
             </a:solidFill>
@@ -5322,7 +5322,7 @@
         </p:nvSpPr>
         <p:spPr>
           <a:xfrm>
-            <a:off x="13020046" y="9496917"/>
+            <a:off x="13061610" y="9496917"/>
             <a:ext cx="287428" cy="371320"/>
           </a:xfrm>
           <a:prstGeom prst="rect">
@@ -5337,13 +5337,18 @@
           <a:lstStyle/>
           <a:p>
             <a:r>
-              <a:rPr lang="pt-PT" sz="1813" dirty="0">
+              <a:rPr lang="pt-PT" sz="1813" dirty="0" smtClean="0">
                 <a:solidFill>
                   <a:schemeClr val="dk1"/>
                 </a:solidFill>
               </a:rPr>
-              <a:t>1</a:t>
-            </a:r>
+              <a:t>N</a:t>
+            </a:r>
+            <a:endParaRPr lang="pt-PT" sz="1813" dirty="0">
+              <a:solidFill>
+                <a:schemeClr val="dk1"/>
+              </a:solidFill>
+            </a:endParaRPr>
           </a:p>
         </p:txBody>
       </p:sp>
@@ -5879,7 +5884,7 @@
           <a:prstGeom prst="line">
             <a:avLst/>
           </a:prstGeom>
-          <a:ln w="3175">
+          <a:ln w="57150">
             <a:solidFill>
               <a:schemeClr val="tx1"/>
             </a:solidFill>
@@ -5917,7 +5922,7 @@
           <a:prstGeom prst="line">
             <a:avLst/>
           </a:prstGeom>
-          <a:ln w="57150">
+          <a:ln w="3175">
             <a:solidFill>
               <a:schemeClr val="tx1"/>
             </a:solidFill>
@@ -6457,7 +6462,7 @@
         </p:nvSpPr>
         <p:spPr>
           <a:xfrm>
-            <a:off x="16700505" y="9481569"/>
+            <a:off x="16714352" y="9463760"/>
             <a:ext cx="1287391" cy="744123"/>
           </a:xfrm>
           <a:prstGeom prst="ellipse">
@@ -6591,11 +6596,11 @@
           <a:p>
             <a:pPr algn="ctr"/>
             <a:r>
-              <a:rPr lang="pt-PT" sz="1247" dirty="0" err="1">
+              <a:rPr lang="pt-PT" sz="1247" dirty="0" smtClean="0">
                 <a:latin typeface="Arial" panose="020B0604020202020204" pitchFamily="34" charset="0"/>
                 <a:cs typeface="Arial" panose="020B0604020202020204" pitchFamily="34" charset="0"/>
               </a:rPr>
-              <a:t>Orcamento_estimado</a:t>
+              <a:t>Descritivo</a:t>
             </a:r>
             <a:endParaRPr lang="pt-PT" sz="1247" dirty="0">
               <a:latin typeface="Arial" panose="020B0604020202020204" pitchFamily="34" charset="0"/>
@@ -6615,8 +6620,8 @@
         </p:nvCxnSpPr>
         <p:spPr>
           <a:xfrm flipV="1">
-            <a:off x="17987896" y="8954577"/>
-            <a:ext cx="1442503" cy="899054"/>
+            <a:off x="18001743" y="8954577"/>
+            <a:ext cx="1428656" cy="881245"/>
           </a:xfrm>
           <a:prstGeom prst="line">
             <a:avLst/>
@@ -7128,7 +7133,7 @@
         </p:nvSpPr>
         <p:spPr>
           <a:xfrm>
-            <a:off x="14355971" y="4220032"/>
+            <a:off x="14335189" y="4240814"/>
             <a:ext cx="287428" cy="371320"/>
           </a:xfrm>
           <a:prstGeom prst="rect">
@@ -7143,46 +7148,57 @@
           <a:lstStyle/>
           <a:p>
             <a:r>
-              <a:rPr lang="pt-PT" sz="1813" dirty="0">
+              <a:rPr lang="pt-PT" sz="1813" dirty="0" smtClean="0">
+                <a:solidFill>
+                  <a:schemeClr val="dk1"/>
+                </a:solidFill>
+              </a:rPr>
+              <a:t>N</a:t>
+            </a:r>
+            <a:endParaRPr lang="pt-PT" sz="1813" dirty="0">
+              <a:solidFill>
+                <a:schemeClr val="dk1"/>
+              </a:solidFill>
+            </a:endParaRPr>
+          </a:p>
+        </p:txBody>
+      </p:sp>
+      <p:sp>
+        <p:nvSpPr>
+          <p:cNvPr id="458" name="TextBox 377"/>
+          <p:cNvSpPr txBox="1"/>
+          <p:nvPr/>
+        </p:nvSpPr>
+        <p:spPr>
+          <a:xfrm>
+            <a:off x="19314915" y="7612891"/>
+            <a:ext cx="330174" cy="371320"/>
+          </a:xfrm>
+          <a:prstGeom prst="rect">
+            <a:avLst/>
+          </a:prstGeom>
+          <a:noFill/>
+        </p:spPr>
+        <p:txBody>
+          <a:bodyPr wrap="square" rtlCol="0">
+            <a:spAutoFit/>
+          </a:bodyPr>
+          <a:lstStyle/>
+          <a:p>
+            <a:pPr algn="ctr"/>
+            <a:r>
+              <a:rPr lang="pt-PT" sz="1813" dirty="0" smtClean="0">
                 <a:solidFill>
                   <a:schemeClr val="dk1"/>
                 </a:solidFill>
               </a:rPr>
               <a:t>1</a:t>
             </a:r>
-          </a:p>
-        </p:txBody>
-      </p:sp>
-      <p:sp>
-        <p:nvSpPr>
-          <p:cNvPr id="458" name="TextBox 377"/>
-          <p:cNvSpPr txBox="1"/>
-          <p:nvPr/>
-        </p:nvSpPr>
-        <p:spPr>
-          <a:xfrm>
-            <a:off x="19314915" y="7529763"/>
-            <a:ext cx="330174" cy="371320"/>
-          </a:xfrm>
-          <a:prstGeom prst="rect">
-            <a:avLst/>
-          </a:prstGeom>
-          <a:noFill/>
-        </p:spPr>
-        <p:txBody>
-          <a:bodyPr wrap="square" rtlCol="0">
-            <a:spAutoFit/>
-          </a:bodyPr>
-          <a:lstStyle/>
-          <a:p>
-            <a:r>
-              <a:rPr lang="pt-PT" sz="1813" dirty="0">
-                <a:solidFill>
-                  <a:schemeClr val="dk1"/>
-                </a:solidFill>
-              </a:rPr>
-              <a:t>N</a:t>
-            </a:r>
+            <a:endParaRPr lang="pt-PT" sz="1813" dirty="0">
+              <a:solidFill>
+                <a:schemeClr val="dk1"/>
+              </a:solidFill>
+            </a:endParaRPr>
           </a:p>
         </p:txBody>
       </p:sp>
@@ -7440,7 +7456,7 @@
         </p:nvSpPr>
         <p:spPr>
           <a:xfrm>
-            <a:off x="4435546" y="4855524"/>
+            <a:off x="4414764" y="4834742"/>
             <a:ext cx="287428" cy="371320"/>
           </a:xfrm>
           <a:prstGeom prst="rect">
@@ -7455,7 +7471,7 @@
           <a:lstStyle/>
           <a:p>
             <a:r>
-              <a:rPr lang="pt-PT" sz="1813" smtClean="0">
+              <a:rPr lang="pt-PT" sz="1813" dirty="0" smtClean="0">
                 <a:solidFill>
                   <a:schemeClr val="dk1"/>
                 </a:solidFill>

</xml_diff>